<commit_message>
fix: prompt para completar lacunas
</commit_message>
<xml_diff>
--- a/questoes.pptx
+++ b/questoes.pptx
@@ -58,6 +58,8 @@
     <p:sldId id="308" r:id="rId55"/>
     <p:sldId id="309" r:id="rId56"/>
     <p:sldId id="310" r:id="rId57"/>
+    <p:sldId id="311" r:id="rId58"/>
+    <p:sldId id="312" r:id="rId59"/>
   </p:sldIdLst>
   <p:sldSz cx="12192000" cy="6858000"/>
   <p:notesSz cx="6858000" cy="9144000"/>
@@ -37659,6 +37661,1000 @@
 </p:sld>
 </file>
 
+<file path=ppt/slides/slide51.xml><?xml version="1.0" encoding="utf-8"?>
+<p:sld xmlns:a="http://schemas.openxmlformats.org/drawingml/2006/main" xmlns:p="http://schemas.openxmlformats.org/presentationml/2006/main" xmlns:r="http://schemas.openxmlformats.org/officeDocument/2006/relationships">
+  <p:cSld>
+    <p:spTree>
+      <p:nvGrpSpPr>
+        <p:cNvPr id="1" name=""/>
+        <p:cNvGrpSpPr/>
+        <p:nvPr/>
+      </p:nvGrpSpPr>
+      <p:grpSpPr/>
+      <p:sp>
+        <p:nvSpPr>
+          <p:cNvPr id="268" name="Google Shape;268;p75"/>
+          <p:cNvSpPr/>
+          <p:nvPr/>
+        </p:nvSpPr>
+        <p:spPr>
+          <a:xfrm>
+            <a:off x="0" y="5918868"/>
+            <a:ext cx="12192000" cy="939132"/>
+          </a:xfrm>
+          <a:prstGeom prst="rect">
+            <a:avLst/>
+          </a:prstGeom>
+          <a:solidFill>
+            <a:srgbClr val="660099"/>
+          </a:solidFill>
+          <a:ln>
+            <a:noFill/>
+          </a:ln>
+        </p:spPr>
+        <p:txBody>
+          <a:bodyPr spcFirstLastPara="1" wrap="square" lIns="91425" tIns="45700" rIns="91425" bIns="45700" anchor="ctr" anchorCtr="0">
+            <a:noAutofit/>
+          </a:bodyPr>
+          <a:lstStyle/>
+          <a:p>
+            <a:pPr marL="0" marR="0" lvl="0" indent="0" algn="ctr" rtl="0">
+              <a:lnSpc>
+                <a:spcPct val="100000"/>
+              </a:lnSpc>
+              <a:spcBef>
+                <a:spcPts val="0"/>
+              </a:spcBef>
+              <a:spcAft>
+                <a:spcPts val="0"/>
+              </a:spcAft>
+              <a:buClr>
+                <a:srgbClr val="000000"/>
+              </a:buClr>
+              <a:buSzPts val="1400"/>
+              <a:buFont typeface="Arial"/>
+              <a:buNone/>
+            </a:pPr>
+            <a:endParaRPr sz="1400" b="0" i="0" u="none" strike="noStrike" cap="none">
+              <a:solidFill>
+                <a:schemeClr val="lt1"/>
+              </a:solidFill>
+              <a:latin typeface="Arial"/>
+              <a:ea typeface="Arial"/>
+              <a:cs typeface="Arial"/>
+              <a:sym typeface="Arial"/>
+            </a:endParaRPr>
+          </a:p>
+        </p:txBody>
+      </p:sp>
+      <p:sp>
+        <p:nvSpPr>
+          <p:cNvPr id="2" name="id">
+            <a:extLst>
+              <a:ext uri="{FF2B5EF4-FFF2-40B4-BE49-F238E27FC236}">
+                <a16:creationId xmlns:a16="http://schemas.microsoft.com/office/drawing/2014/main" id="{610377F9-9C6E-B1A4-973A-EE060D5DC64F}"/>
+              </a:ext>
+            </a:extLst>
+          </p:cNvPr>
+          <p:cNvSpPr txBox="1"/>
+          <p:nvPr/>
+        </p:nvSpPr>
+        <p:spPr>
+          <a:xfrm>
+            <a:off x="4127491" y="401392"/>
+            <a:ext cx="2767580" cy="380104"/>
+          </a:xfrm>
+          <a:prstGeom prst="rect">
+            <a:avLst/>
+          </a:prstGeom>
+          <a:noFill/>
+        </p:spPr>
+        <p:txBody>
+          <a:bodyPr wrap="square" rtlCol="0">
+            <a:spAutoFit/>
+          </a:bodyPr>
+          <a:lstStyle/>
+          <a:p>
+            <a:r>
+              <a:t>Questão 51</a:t>
+            </a:r>
+          </a:p>
+        </p:txBody>
+      </p:sp>
+      <p:sp>
+        <p:nvSpPr>
+          <p:cNvPr id="3" name="questao">
+            <a:extLst>
+              <a:ext uri="{FF2B5EF4-FFF2-40B4-BE49-F238E27FC236}">
+                <a16:creationId xmlns:a16="http://schemas.microsoft.com/office/drawing/2014/main" id="{7E06809A-A82A-80BB-2B0C-DE7439EDC88F}"/>
+              </a:ext>
+            </a:extLst>
+          </p:cNvPr>
+          <p:cNvSpPr txBox="1"/>
+          <p:nvPr/>
+        </p:nvSpPr>
+        <p:spPr>
+          <a:xfrm>
+            <a:off x="5053913" y="908166"/>
+            <a:ext cx="6951459" cy="4884040"/>
+          </a:xfrm>
+          <a:prstGeom prst="rect">
+            <a:avLst/>
+          </a:prstGeom>
+          <a:noFill/>
+          <a:ln>
+            <a:noFill/>
+          </a:ln>
+        </p:spPr>
+        <p:txBody>
+          <a:bodyPr spcFirstLastPara="1" wrap="square" lIns="91425" tIns="45700" rIns="91425" bIns="45700" anchor="t" anchorCtr="0">
+            <a:normAutofit/>
+          </a:bodyPr>
+          <a:lstStyle/>
+          <a:p>
+            <a:r>
+              <a:t>Introdução:</a:t>
+            </a:r>
+          </a:p>
+          <a:p>
+            <a:r>
+              <a:t>A utilização de dados e tecnologias digitais para experimentação, validação de hipóteses e tomada de decisão é cada vez mais presente em diversas áreas de negócio. A Ciência de Dados e o uso da Transformação Digital tem permitido a melhoria das decisões tomadas com base em dados e evidências.</a:t>
+            </a:r>
+          </a:p>
+          <a:p/>
+          <a:p>
+            <a:r>
+              <a:t>Questão:</a:t>
+            </a:r>
+          </a:p>
+          <a:p>
+            <a:r>
+              <a:t>Qual das opções abaixo melhor descreve uma das vantagens de se utilizar a Transformação Digital para tomar decisões baseadas em dados?</a:t>
+            </a:r>
+          </a:p>
+          <a:p/>
+          <a:p>
+            <a:r>
+              <a:t>A) Diminuição do custo das decisões;</a:t>
+            </a:r>
+          </a:p>
+          <a:p>
+            <a:r>
+              <a:t>B) Amadurecimento da tecnologia usada;</a:t>
+            </a:r>
+          </a:p>
+          <a:p>
+            <a:r>
+              <a:t>C) Maior velocidade no processamento dos dados;</a:t>
+            </a:r>
+          </a:p>
+          <a:p>
+            <a:r>
+              <a:t>D) Maior precisão nas decisões. </a:t>
+            </a:r>
+          </a:p>
+          <a:p/>
+          <a:p>
+            <a:r>
+              <a:t>Resposta Correta: D) Maior precisão nas decisões.</a:t>
+            </a:r>
+          </a:p>
+          <a:p>
+            <a:r>
+              <a:t>Justificativa: A Transformação Digital tem permitido uma maior previsibilidade e precisão nos processos de tomada de decisão, pois permite racionalizar o processo de coleta, produção e análise de dados, em comparação aos mecanismos convencionais. A opção A) não está relacionada com a Transformação Digital, pois esta pode ajudar a diminuir custos, mas não é o seu principal objetivo. A opção B) não está relacionada com a Transformação Digital, pois esta não tem como objetivo amadurecer as tecnologias usadas. A opção C) está relacionada, pois uma das vantagens é exatamente a maior velocidade no processamento de dados, mas não é o principal objetivo. Já a opção D) descreve corretamente uma das vantagens da Transformação Digital para decisões baseadas em dados: maior precisão nas decisões.</a:t>
+            </a:r>
+          </a:p>
+        </p:txBody>
+      </p:sp>
+      <p:sp>
+        <p:nvSpPr>
+          <p:cNvPr id="4" name="TextBox 3">
+            <a:extLst>
+              <a:ext uri="{FF2B5EF4-FFF2-40B4-BE49-F238E27FC236}">
+                <a16:creationId xmlns:a16="http://schemas.microsoft.com/office/drawing/2014/main" id="{AC5F8A76-0E52-0098-2D39-CFC6026211CB}"/>
+              </a:ext>
+            </a:extLst>
+          </p:cNvPr>
+          <p:cNvSpPr txBox="1"/>
+          <p:nvPr/>
+        </p:nvSpPr>
+        <p:spPr>
+          <a:xfrm>
+            <a:off x="213681" y="1256602"/>
+            <a:ext cx="763351" cy="338554"/>
+          </a:xfrm>
+          <a:prstGeom prst="rect">
+            <a:avLst/>
+          </a:prstGeom>
+          <a:noFill/>
+        </p:spPr>
+        <p:txBody>
+          <a:bodyPr wrap="none" rtlCol="0">
+            <a:spAutoFit/>
+          </a:bodyPr>
+          <a:lstStyle/>
+          <a:p>
+            <a:r>
+              <a:rPr lang="en-BR" sz="1600" b="1" dirty="0">
+                <a:solidFill>
+                  <a:srgbClr val="666666"/>
+                </a:solidFill>
+                <a:highlight>
+                  <a:srgbClr val="FFFFFF"/>
+                </a:highlight>
+                <a:latin typeface="Verdana"/>
+                <a:ea typeface="Verdana"/>
+                <a:cs typeface="Verdana"/>
+              </a:rPr>
+              <a:t>Tipo:</a:t>
+            </a:r>
+          </a:p>
+        </p:txBody>
+      </p:sp>
+      <p:sp>
+        <p:nvSpPr>
+          <p:cNvPr id="5" name="tipo">
+            <a:extLst>
+              <a:ext uri="{FF2B5EF4-FFF2-40B4-BE49-F238E27FC236}">
+                <a16:creationId xmlns:a16="http://schemas.microsoft.com/office/drawing/2014/main" id="{21501ADC-C5B2-F471-1590-9A0357334EF0}"/>
+              </a:ext>
+            </a:extLst>
+          </p:cNvPr>
+          <p:cNvSpPr txBox="1"/>
+          <p:nvPr/>
+        </p:nvSpPr>
+        <p:spPr>
+          <a:xfrm>
+            <a:off x="977032" y="1271990"/>
+            <a:ext cx="4076882" cy="338554"/>
+          </a:xfrm>
+          <a:prstGeom prst="rect">
+            <a:avLst/>
+          </a:prstGeom>
+          <a:noFill/>
+        </p:spPr>
+        <p:txBody>
+          <a:bodyPr wrap="square" rtlCol="0">
+            <a:spAutoFit/>
+          </a:bodyPr>
+          <a:lstStyle/>
+          <a:p>
+            <a:r>
+              <a:t>Dissertativa</a:t>
+            </a:r>
+          </a:p>
+        </p:txBody>
+      </p:sp>
+      <p:sp>
+        <p:nvSpPr>
+          <p:cNvPr id="6" name="TextBox 5">
+            <a:extLst>
+              <a:ext uri="{FF2B5EF4-FFF2-40B4-BE49-F238E27FC236}">
+                <a16:creationId xmlns:a16="http://schemas.microsoft.com/office/drawing/2014/main" id="{5E97C5ED-FF97-6ED3-09F4-6739643D7865}"/>
+              </a:ext>
+            </a:extLst>
+          </p:cNvPr>
+          <p:cNvSpPr txBox="1"/>
+          <p:nvPr/>
+        </p:nvSpPr>
+        <p:spPr>
+          <a:xfrm>
+            <a:off x="79029" y="1705216"/>
+            <a:ext cx="898003" cy="338554"/>
+          </a:xfrm>
+          <a:prstGeom prst="rect">
+            <a:avLst/>
+          </a:prstGeom>
+          <a:noFill/>
+        </p:spPr>
+        <p:txBody>
+          <a:bodyPr wrap="none" rtlCol="0">
+            <a:spAutoFit/>
+          </a:bodyPr>
+          <a:lstStyle/>
+          <a:p>
+            <a:r>
+              <a:rPr lang="en-BR" sz="1600" b="1" dirty="0">
+                <a:solidFill>
+                  <a:srgbClr val="666666"/>
+                </a:solidFill>
+                <a:highlight>
+                  <a:srgbClr val="FFFFFF"/>
+                </a:highlight>
+                <a:latin typeface="Verdana"/>
+                <a:ea typeface="Verdana"/>
+                <a:cs typeface="Verdana"/>
+              </a:rPr>
+              <a:t>Tema:</a:t>
+            </a:r>
+          </a:p>
+        </p:txBody>
+      </p:sp>
+      <p:sp>
+        <p:nvSpPr>
+          <p:cNvPr id="7" name="area">
+            <a:extLst>
+              <a:ext uri="{FF2B5EF4-FFF2-40B4-BE49-F238E27FC236}">
+                <a16:creationId xmlns:a16="http://schemas.microsoft.com/office/drawing/2014/main" id="{7543BDE5-1195-68EB-DC69-0854E7A0F816}"/>
+              </a:ext>
+            </a:extLst>
+          </p:cNvPr>
+          <p:cNvSpPr txBox="1"/>
+          <p:nvPr/>
+        </p:nvSpPr>
+        <p:spPr>
+          <a:xfrm>
+            <a:off x="977032" y="1705216"/>
+            <a:ext cx="4076882" cy="338554"/>
+          </a:xfrm>
+          <a:prstGeom prst="rect">
+            <a:avLst/>
+          </a:prstGeom>
+          <a:noFill/>
+        </p:spPr>
+        <p:txBody>
+          <a:bodyPr wrap="square" rtlCol="0">
+            <a:spAutoFit/>
+          </a:bodyPr>
+          <a:lstStyle/>
+          <a:p>
+            <a:r>
+              <a:t>Transformação Digital</a:t>
+            </a:r>
+          </a:p>
+        </p:txBody>
+      </p:sp>
+      <p:sp>
+        <p:nvSpPr>
+          <p:cNvPr id="8" name="TextBox 7">
+            <a:extLst>
+              <a:ext uri="{FF2B5EF4-FFF2-40B4-BE49-F238E27FC236}">
+                <a16:creationId xmlns:a16="http://schemas.microsoft.com/office/drawing/2014/main" id="{80C39CBB-3628-A049-A191-CB21F2F2EA73}"/>
+              </a:ext>
+            </a:extLst>
+          </p:cNvPr>
+          <p:cNvSpPr txBox="1"/>
+          <p:nvPr/>
+        </p:nvSpPr>
+        <p:spPr>
+          <a:xfrm>
+            <a:off x="79029" y="2138442"/>
+            <a:ext cx="851515" cy="338554"/>
+          </a:xfrm>
+          <a:prstGeom prst="rect">
+            <a:avLst/>
+          </a:prstGeom>
+          <a:noFill/>
+        </p:spPr>
+        <p:txBody>
+          <a:bodyPr wrap="none" rtlCol="0">
+            <a:spAutoFit/>
+          </a:bodyPr>
+          <a:lstStyle/>
+          <a:p>
+            <a:r>
+              <a:rPr lang="en-BR" sz="1600" b="1" dirty="0">
+                <a:solidFill>
+                  <a:srgbClr val="666666"/>
+                </a:solidFill>
+                <a:highlight>
+                  <a:srgbClr val="FFFFFF"/>
+                </a:highlight>
+                <a:latin typeface="Verdana"/>
+                <a:ea typeface="Verdana"/>
+                <a:cs typeface="Verdana"/>
+              </a:rPr>
+              <a:t>Nível:</a:t>
+            </a:r>
+          </a:p>
+        </p:txBody>
+      </p:sp>
+      <p:sp>
+        <p:nvSpPr>
+          <p:cNvPr id="9" name="nivel">
+            <a:extLst>
+              <a:ext uri="{FF2B5EF4-FFF2-40B4-BE49-F238E27FC236}">
+                <a16:creationId xmlns:a16="http://schemas.microsoft.com/office/drawing/2014/main" id="{63744DEF-5ED1-3257-0263-CBE8E2A4CB75}"/>
+              </a:ext>
+            </a:extLst>
+          </p:cNvPr>
+          <p:cNvSpPr txBox="1"/>
+          <p:nvPr/>
+        </p:nvSpPr>
+        <p:spPr>
+          <a:xfrm>
+            <a:off x="977032" y="2138442"/>
+            <a:ext cx="4076882" cy="338554"/>
+          </a:xfrm>
+          <a:prstGeom prst="rect">
+            <a:avLst/>
+          </a:prstGeom>
+          <a:noFill/>
+        </p:spPr>
+        <p:txBody>
+          <a:bodyPr wrap="square" rtlCol="0">
+            <a:spAutoFit/>
+          </a:bodyPr>
+          <a:lstStyle/>
+          <a:p>
+            <a:r>
+              <a:t>Complexo</a:t>
+            </a:r>
+          </a:p>
+        </p:txBody>
+      </p:sp>
+      <p:pic>
+        <p:nvPicPr>
+          <p:cNvPr id="269" name="Picture 268" descr="image.png"/>
+          <p:cNvPicPr>
+            <a:picLocks noChangeAspect="1"/>
+          </p:cNvPicPr>
+          <p:nvPr/>
+        </p:nvPicPr>
+        <p:blipFill>
+          <a:blip r:embed="rId2"/>
+          <a:stretch>
+            <a:fillRect/>
+          </a:stretch>
+        </p:blipFill>
+        <p:spPr>
+          <a:xfrm>
+            <a:off x="10444533" y="6045538"/>
+            <a:ext cx="1654633" cy="685800"/>
+          </a:xfrm>
+          <a:prstGeom prst="rect">
+            <a:avLst/>
+          </a:prstGeom>
+        </p:spPr>
+      </p:pic>
+      <p:pic>
+        <p:nvPicPr>
+          <p:cNvPr id="270" name="Picture 269" descr="image.png"/>
+          <p:cNvPicPr>
+            <a:picLocks noChangeAspect="1"/>
+          </p:cNvPicPr>
+          <p:nvPr/>
+        </p:nvPicPr>
+        <p:blipFill>
+          <a:blip r:embed="rId3"/>
+          <a:stretch>
+            <a:fillRect/>
+          </a:stretch>
+        </p:blipFill>
+        <p:spPr>
+          <a:xfrm>
+            <a:off x="411552" y="345296"/>
+            <a:ext cx="1031259" cy="568224"/>
+          </a:xfrm>
+          <a:prstGeom prst="rect">
+            <a:avLst/>
+          </a:prstGeom>
+        </p:spPr>
+      </p:pic>
+      <p:pic>
+        <p:nvPicPr>
+          <p:cNvPr id="271" name="Picture 270" descr="image.png"/>
+          <p:cNvPicPr>
+            <a:picLocks noChangeAspect="1"/>
+          </p:cNvPicPr>
+          <p:nvPr/>
+        </p:nvPicPr>
+        <p:blipFill>
+          <a:blip r:embed="rId4"/>
+          <a:stretch>
+            <a:fillRect/>
+          </a:stretch>
+        </p:blipFill>
+        <p:spPr>
+          <a:xfrm>
+            <a:off x="9842974" y="-16728"/>
+            <a:ext cx="2162400" cy="1216350"/>
+          </a:xfrm>
+          <a:prstGeom prst="rect">
+            <a:avLst/>
+          </a:prstGeom>
+        </p:spPr>
+      </p:pic>
+    </p:spTree>
+  </p:cSld>
+  <p:clrMapOvr>
+    <a:masterClrMapping/>
+  </p:clrMapOvr>
+</p:sld>
+</file>
+
+<file path=ppt/slides/slide52.xml><?xml version="1.0" encoding="utf-8"?>
+<p:sld xmlns:a="http://schemas.openxmlformats.org/drawingml/2006/main" xmlns:p="http://schemas.openxmlformats.org/presentationml/2006/main" xmlns:r="http://schemas.openxmlformats.org/officeDocument/2006/relationships">
+  <p:cSld>
+    <p:spTree>
+      <p:nvGrpSpPr>
+        <p:cNvPr id="1" name=""/>
+        <p:cNvGrpSpPr/>
+        <p:nvPr/>
+      </p:nvGrpSpPr>
+      <p:grpSpPr/>
+      <p:sp>
+        <p:nvSpPr>
+          <p:cNvPr id="268" name="Google Shape;268;p75"/>
+          <p:cNvSpPr/>
+          <p:nvPr/>
+        </p:nvSpPr>
+        <p:spPr>
+          <a:xfrm>
+            <a:off x="0" y="5918868"/>
+            <a:ext cx="12192000" cy="939132"/>
+          </a:xfrm>
+          <a:prstGeom prst="rect">
+            <a:avLst/>
+          </a:prstGeom>
+          <a:solidFill>
+            <a:srgbClr val="660099"/>
+          </a:solidFill>
+          <a:ln>
+            <a:noFill/>
+          </a:ln>
+        </p:spPr>
+        <p:txBody>
+          <a:bodyPr spcFirstLastPara="1" wrap="square" lIns="91425" tIns="45700" rIns="91425" bIns="45700" anchor="ctr" anchorCtr="0">
+            <a:noAutofit/>
+          </a:bodyPr>
+          <a:lstStyle/>
+          <a:p>
+            <a:pPr marL="0" marR="0" lvl="0" indent="0" algn="ctr" rtl="0">
+              <a:lnSpc>
+                <a:spcPct val="100000"/>
+              </a:lnSpc>
+              <a:spcBef>
+                <a:spcPts val="0"/>
+              </a:spcBef>
+              <a:spcAft>
+                <a:spcPts val="0"/>
+              </a:spcAft>
+              <a:buClr>
+                <a:srgbClr val="000000"/>
+              </a:buClr>
+              <a:buSzPts val="1400"/>
+              <a:buFont typeface="Arial"/>
+              <a:buNone/>
+            </a:pPr>
+            <a:endParaRPr sz="1400" b="0" i="0" u="none" strike="noStrike" cap="none">
+              <a:solidFill>
+                <a:schemeClr val="lt1"/>
+              </a:solidFill>
+              <a:latin typeface="Arial"/>
+              <a:ea typeface="Arial"/>
+              <a:cs typeface="Arial"/>
+              <a:sym typeface="Arial"/>
+            </a:endParaRPr>
+          </a:p>
+        </p:txBody>
+      </p:sp>
+      <p:sp>
+        <p:nvSpPr>
+          <p:cNvPr id="2" name="id">
+            <a:extLst>
+              <a:ext uri="{FF2B5EF4-FFF2-40B4-BE49-F238E27FC236}">
+                <a16:creationId xmlns:a16="http://schemas.microsoft.com/office/drawing/2014/main" id="{610377F9-9C6E-B1A4-973A-EE060D5DC64F}"/>
+              </a:ext>
+            </a:extLst>
+          </p:cNvPr>
+          <p:cNvSpPr txBox="1"/>
+          <p:nvPr/>
+        </p:nvSpPr>
+        <p:spPr>
+          <a:xfrm>
+            <a:off x="4127491" y="401392"/>
+            <a:ext cx="2767580" cy="380104"/>
+          </a:xfrm>
+          <a:prstGeom prst="rect">
+            <a:avLst/>
+          </a:prstGeom>
+          <a:noFill/>
+        </p:spPr>
+        <p:txBody>
+          <a:bodyPr wrap="square" rtlCol="0">
+            <a:spAutoFit/>
+          </a:bodyPr>
+          <a:lstStyle/>
+          <a:p>
+            <a:r>
+              <a:t>Questão 52</a:t>
+            </a:r>
+          </a:p>
+        </p:txBody>
+      </p:sp>
+      <p:sp>
+        <p:nvSpPr>
+          <p:cNvPr id="3" name="questao">
+            <a:extLst>
+              <a:ext uri="{FF2B5EF4-FFF2-40B4-BE49-F238E27FC236}">
+                <a16:creationId xmlns:a16="http://schemas.microsoft.com/office/drawing/2014/main" id="{7E06809A-A82A-80BB-2B0C-DE7439EDC88F}"/>
+              </a:ext>
+            </a:extLst>
+          </p:cNvPr>
+          <p:cNvSpPr txBox="1"/>
+          <p:nvPr/>
+        </p:nvSpPr>
+        <p:spPr>
+          <a:xfrm>
+            <a:off x="5053913" y="908166"/>
+            <a:ext cx="6951459" cy="4884040"/>
+          </a:xfrm>
+          <a:prstGeom prst="rect">
+            <a:avLst/>
+          </a:prstGeom>
+          <a:noFill/>
+          <a:ln>
+            <a:noFill/>
+          </a:ln>
+        </p:spPr>
+        <p:txBody>
+          <a:bodyPr spcFirstLastPara="1" wrap="square" lIns="91425" tIns="45700" rIns="91425" bIns="45700" anchor="t" anchorCtr="0">
+            <a:normAutofit/>
+          </a:bodyPr>
+          <a:lstStyle/>
+          <a:p>
+            <a:r>
+              <a:t>Questão:</a:t>
+            </a:r>
+          </a:p>
+          <a:p/>
+          <a:p>
+            <a:r>
+              <a:t>A tecnologia blockchain é usada para melhorar a transparência e segurança em diversas iniciativas transformadoras. Blockchain fornece às empresas a capacidade de trabalhar com transações descentralizadas nos setores de supply chain, saúde e finanças, permitindo a execução de transações em uma rede de computadores relacionados, o que proporciona maior segurança e ______.</a:t>
+            </a:r>
+          </a:p>
+          <a:p/>
+          <a:p>
+            <a:r>
+              <a:t>(A) audibilidade</a:t>
+            </a:r>
+          </a:p>
+          <a:p>
+            <a:r>
+              <a:t>(B) compartilhamento</a:t>
+            </a:r>
+          </a:p>
+          <a:p>
+            <a:r>
+              <a:t>(C) escalabilidade</a:t>
+            </a:r>
+          </a:p>
+          <a:p>
+            <a:r>
+              <a:t>(D) imutabilidade</a:t>
+            </a:r>
+          </a:p>
+          <a:p>
+            <a:r>
+              <a:t>(E) visibilidade</a:t>
+            </a:r>
+          </a:p>
+          <a:p/>
+          <a:p>
+            <a:r>
+              <a:t>Resposta: D - imutabilidade. A blockchain permite que transações sejam executadas de forma mais segura e imutável, o que significa que os dados armazenados não podem ser alterados ou excluídos dos registros.</a:t>
+            </a:r>
+          </a:p>
+        </p:txBody>
+      </p:sp>
+      <p:sp>
+        <p:nvSpPr>
+          <p:cNvPr id="4" name="TextBox 3">
+            <a:extLst>
+              <a:ext uri="{FF2B5EF4-FFF2-40B4-BE49-F238E27FC236}">
+                <a16:creationId xmlns:a16="http://schemas.microsoft.com/office/drawing/2014/main" id="{AC5F8A76-0E52-0098-2D39-CFC6026211CB}"/>
+              </a:ext>
+            </a:extLst>
+          </p:cNvPr>
+          <p:cNvSpPr txBox="1"/>
+          <p:nvPr/>
+        </p:nvSpPr>
+        <p:spPr>
+          <a:xfrm>
+            <a:off x="213681" y="1256602"/>
+            <a:ext cx="763351" cy="338554"/>
+          </a:xfrm>
+          <a:prstGeom prst="rect">
+            <a:avLst/>
+          </a:prstGeom>
+          <a:noFill/>
+        </p:spPr>
+        <p:txBody>
+          <a:bodyPr wrap="none" rtlCol="0">
+            <a:spAutoFit/>
+          </a:bodyPr>
+          <a:lstStyle/>
+          <a:p>
+            <a:r>
+              <a:rPr lang="en-BR" sz="1600" b="1" dirty="0">
+                <a:solidFill>
+                  <a:srgbClr val="666666"/>
+                </a:solidFill>
+                <a:highlight>
+                  <a:srgbClr val="FFFFFF"/>
+                </a:highlight>
+                <a:latin typeface="Verdana"/>
+                <a:ea typeface="Verdana"/>
+                <a:cs typeface="Verdana"/>
+              </a:rPr>
+              <a:t>Tipo:</a:t>
+            </a:r>
+          </a:p>
+        </p:txBody>
+      </p:sp>
+      <p:sp>
+        <p:nvSpPr>
+          <p:cNvPr id="5" name="tipo">
+            <a:extLst>
+              <a:ext uri="{FF2B5EF4-FFF2-40B4-BE49-F238E27FC236}">
+                <a16:creationId xmlns:a16="http://schemas.microsoft.com/office/drawing/2014/main" id="{21501ADC-C5B2-F471-1590-9A0357334EF0}"/>
+              </a:ext>
+            </a:extLst>
+          </p:cNvPr>
+          <p:cNvSpPr txBox="1"/>
+          <p:nvPr/>
+        </p:nvSpPr>
+        <p:spPr>
+          <a:xfrm>
+            <a:off x="977032" y="1271990"/>
+            <a:ext cx="4076882" cy="338554"/>
+          </a:xfrm>
+          <a:prstGeom prst="rect">
+            <a:avLst/>
+          </a:prstGeom>
+          <a:noFill/>
+        </p:spPr>
+        <p:txBody>
+          <a:bodyPr wrap="square" rtlCol="0">
+            <a:spAutoFit/>
+          </a:bodyPr>
+          <a:lstStyle/>
+          <a:p>
+            <a:r>
+              <a:t>Completar as Lacunas</a:t>
+            </a:r>
+          </a:p>
+        </p:txBody>
+      </p:sp>
+      <p:sp>
+        <p:nvSpPr>
+          <p:cNvPr id="6" name="TextBox 5">
+            <a:extLst>
+              <a:ext uri="{FF2B5EF4-FFF2-40B4-BE49-F238E27FC236}">
+                <a16:creationId xmlns:a16="http://schemas.microsoft.com/office/drawing/2014/main" id="{5E97C5ED-FF97-6ED3-09F4-6739643D7865}"/>
+              </a:ext>
+            </a:extLst>
+          </p:cNvPr>
+          <p:cNvSpPr txBox="1"/>
+          <p:nvPr/>
+        </p:nvSpPr>
+        <p:spPr>
+          <a:xfrm>
+            <a:off x="79029" y="1705216"/>
+            <a:ext cx="898003" cy="338554"/>
+          </a:xfrm>
+          <a:prstGeom prst="rect">
+            <a:avLst/>
+          </a:prstGeom>
+          <a:noFill/>
+        </p:spPr>
+        <p:txBody>
+          <a:bodyPr wrap="none" rtlCol="0">
+            <a:spAutoFit/>
+          </a:bodyPr>
+          <a:lstStyle/>
+          <a:p>
+            <a:r>
+              <a:rPr lang="en-BR" sz="1600" b="1" dirty="0">
+                <a:solidFill>
+                  <a:srgbClr val="666666"/>
+                </a:solidFill>
+                <a:highlight>
+                  <a:srgbClr val="FFFFFF"/>
+                </a:highlight>
+                <a:latin typeface="Verdana"/>
+                <a:ea typeface="Verdana"/>
+                <a:cs typeface="Verdana"/>
+              </a:rPr>
+              <a:t>Tema:</a:t>
+            </a:r>
+          </a:p>
+        </p:txBody>
+      </p:sp>
+      <p:sp>
+        <p:nvSpPr>
+          <p:cNvPr id="7" name="area">
+            <a:extLst>
+              <a:ext uri="{FF2B5EF4-FFF2-40B4-BE49-F238E27FC236}">
+                <a16:creationId xmlns:a16="http://schemas.microsoft.com/office/drawing/2014/main" id="{7543BDE5-1195-68EB-DC69-0854E7A0F816}"/>
+              </a:ext>
+            </a:extLst>
+          </p:cNvPr>
+          <p:cNvSpPr txBox="1"/>
+          <p:nvPr/>
+        </p:nvSpPr>
+        <p:spPr>
+          <a:xfrm>
+            <a:off x="977032" y="1705216"/>
+            <a:ext cx="4076882" cy="338554"/>
+          </a:xfrm>
+          <a:prstGeom prst="rect">
+            <a:avLst/>
+          </a:prstGeom>
+          <a:noFill/>
+        </p:spPr>
+        <p:txBody>
+          <a:bodyPr wrap="square" rtlCol="0">
+            <a:spAutoFit/>
+          </a:bodyPr>
+          <a:lstStyle/>
+          <a:p>
+            <a:r>
+              <a:t>Transformação Digital</a:t>
+            </a:r>
+          </a:p>
+        </p:txBody>
+      </p:sp>
+      <p:sp>
+        <p:nvSpPr>
+          <p:cNvPr id="8" name="TextBox 7">
+            <a:extLst>
+              <a:ext uri="{FF2B5EF4-FFF2-40B4-BE49-F238E27FC236}">
+                <a16:creationId xmlns:a16="http://schemas.microsoft.com/office/drawing/2014/main" id="{80C39CBB-3628-A049-A191-CB21F2F2EA73}"/>
+              </a:ext>
+            </a:extLst>
+          </p:cNvPr>
+          <p:cNvSpPr txBox="1"/>
+          <p:nvPr/>
+        </p:nvSpPr>
+        <p:spPr>
+          <a:xfrm>
+            <a:off x="79029" y="2138442"/>
+            <a:ext cx="851515" cy="338554"/>
+          </a:xfrm>
+          <a:prstGeom prst="rect">
+            <a:avLst/>
+          </a:prstGeom>
+          <a:noFill/>
+        </p:spPr>
+        <p:txBody>
+          <a:bodyPr wrap="none" rtlCol="0">
+            <a:spAutoFit/>
+          </a:bodyPr>
+          <a:lstStyle/>
+          <a:p>
+            <a:r>
+              <a:rPr lang="en-BR" sz="1600" b="1" dirty="0">
+                <a:solidFill>
+                  <a:srgbClr val="666666"/>
+                </a:solidFill>
+                <a:highlight>
+                  <a:srgbClr val="FFFFFF"/>
+                </a:highlight>
+                <a:latin typeface="Verdana"/>
+                <a:ea typeface="Verdana"/>
+                <a:cs typeface="Verdana"/>
+              </a:rPr>
+              <a:t>Nível:</a:t>
+            </a:r>
+          </a:p>
+        </p:txBody>
+      </p:sp>
+      <p:sp>
+        <p:nvSpPr>
+          <p:cNvPr id="9" name="nivel">
+            <a:extLst>
+              <a:ext uri="{FF2B5EF4-FFF2-40B4-BE49-F238E27FC236}">
+                <a16:creationId xmlns:a16="http://schemas.microsoft.com/office/drawing/2014/main" id="{63744DEF-5ED1-3257-0263-CBE8E2A4CB75}"/>
+              </a:ext>
+            </a:extLst>
+          </p:cNvPr>
+          <p:cNvSpPr txBox="1"/>
+          <p:nvPr/>
+        </p:nvSpPr>
+        <p:spPr>
+          <a:xfrm>
+            <a:off x="977032" y="2138442"/>
+            <a:ext cx="4076882" cy="338554"/>
+          </a:xfrm>
+          <a:prstGeom prst="rect">
+            <a:avLst/>
+          </a:prstGeom>
+          <a:noFill/>
+        </p:spPr>
+        <p:txBody>
+          <a:bodyPr wrap="square" rtlCol="0">
+            <a:spAutoFit/>
+          </a:bodyPr>
+          <a:lstStyle/>
+          <a:p>
+            <a:r>
+              <a:t>Fácil</a:t>
+            </a:r>
+          </a:p>
+        </p:txBody>
+      </p:sp>
+      <p:pic>
+        <p:nvPicPr>
+          <p:cNvPr id="269" name="Picture 268" descr="image.png"/>
+          <p:cNvPicPr>
+            <a:picLocks noChangeAspect="1"/>
+          </p:cNvPicPr>
+          <p:nvPr/>
+        </p:nvPicPr>
+        <p:blipFill>
+          <a:blip r:embed="rId2"/>
+          <a:stretch>
+            <a:fillRect/>
+          </a:stretch>
+        </p:blipFill>
+        <p:spPr>
+          <a:xfrm>
+            <a:off x="10444533" y="6045538"/>
+            <a:ext cx="1654633" cy="685800"/>
+          </a:xfrm>
+          <a:prstGeom prst="rect">
+            <a:avLst/>
+          </a:prstGeom>
+        </p:spPr>
+      </p:pic>
+      <p:pic>
+        <p:nvPicPr>
+          <p:cNvPr id="270" name="Picture 269" descr="image.png"/>
+          <p:cNvPicPr>
+            <a:picLocks noChangeAspect="1"/>
+          </p:cNvPicPr>
+          <p:nvPr/>
+        </p:nvPicPr>
+        <p:blipFill>
+          <a:blip r:embed="rId3"/>
+          <a:stretch>
+            <a:fillRect/>
+          </a:stretch>
+        </p:blipFill>
+        <p:spPr>
+          <a:xfrm>
+            <a:off x="411552" y="345296"/>
+            <a:ext cx="1031259" cy="568224"/>
+          </a:xfrm>
+          <a:prstGeom prst="rect">
+            <a:avLst/>
+          </a:prstGeom>
+        </p:spPr>
+      </p:pic>
+      <p:pic>
+        <p:nvPicPr>
+          <p:cNvPr id="271" name="Picture 270" descr="image.png"/>
+          <p:cNvPicPr>
+            <a:picLocks noChangeAspect="1"/>
+          </p:cNvPicPr>
+          <p:nvPr/>
+        </p:nvPicPr>
+        <p:blipFill>
+          <a:blip r:embed="rId4"/>
+          <a:stretch>
+            <a:fillRect/>
+          </a:stretch>
+        </p:blipFill>
+        <p:spPr>
+          <a:xfrm>
+            <a:off x="9842974" y="-16728"/>
+            <a:ext cx="2162400" cy="1216350"/>
+          </a:xfrm>
+          <a:prstGeom prst="rect">
+            <a:avLst/>
+          </a:prstGeom>
+        </p:spPr>
+      </p:pic>
+    </p:spTree>
+  </p:cSld>
+  <p:clrMapOvr>
+    <a:masterClrMapping/>
+  </p:clrMapOvr>
+</p:sld>
+</file>
+
 <file path=ppt/slides/slide6.xml><?xml version="1.0" encoding="utf-8"?>
 <p:sld xmlns:a="http://schemas.openxmlformats.org/drawingml/2006/main" xmlns:p="http://schemas.openxmlformats.org/presentationml/2006/main" xmlns:r="http://schemas.openxmlformats.org/officeDocument/2006/relationships">
   <p:cSld>

</xml_diff>